<commit_message>
Docs: Update Diagrams and PPTX replace browser panel with person panel
</commit_message>
<xml_diff>
--- a/docs/diagrams/ArchitectureDiagram.pptx
+++ b/docs/diagrams/ArchitectureDiagram.pptx
@@ -107,7 +107,27 @@
       </a:defRPr>
     </a:lvl9pPr>
   </p:defaultTextStyle>
+  <p:extLst>
+    <p:ext uri="{EFAFB233-063F-42B5-8137-9DF3F51BA10A}">
+      <p15:sldGuideLst xmlns:p15="http://schemas.microsoft.com/office/powerpoint/2012/main">
+        <p15:guide id="1" orient="horz" pos="1488">
+          <p15:clr>
+            <a:srgbClr val="A4A3A4"/>
+          </p15:clr>
+        </p15:guide>
+        <p15:guide id="2" pos="2880">
+          <p15:clr>
+            <a:srgbClr val="A4A3A4"/>
+          </p15:clr>
+        </p15:guide>
+      </p15:sldGuideLst>
+    </p:ext>
+  </p:extLst>
 </p:presentation>
+</file>
+
+<file path=ppt/revisionInfo.xml><?xml version="1.0" encoding="utf-8"?>
+<p1510:revInfo xmlns:a="http://schemas.openxmlformats.org/drawingml/2006/main" xmlns:r="http://schemas.openxmlformats.org/officeDocument/2006/relationships" xmlns:p1510="http://schemas.microsoft.com/office/powerpoint/2015/10/main"/>
 </file>
 
 <file path=ppt/notesMasters/notesMaster1.xml><?xml version="1.0" encoding="utf-8"?>
@@ -192,7 +212,7 @@
           <a:p>
             <a:fld id="{F5CC4B3F-88C1-4FFA-B1B6-F41C21DC6924}" type="datetimeFigureOut">
               <a:rPr lang="en-US" smtClean="0"/>
-              <a:t>10/16/2016</a:t>
+              <a:t>10/7/2017</a:t>
             </a:fld>
             <a:endParaRPr lang="en-US"/>
           </a:p>
@@ -256,38 +276,37 @@
           <a:p>
             <a:pPr lvl="0"/>
             <a:r>
-              <a:rPr lang="en-US" smtClean="0"/>
+              <a:rPr lang="en-US"/>
               <a:t>Click to edit Master text styles</a:t>
             </a:r>
           </a:p>
           <a:p>
             <a:pPr lvl="1"/>
             <a:r>
-              <a:rPr lang="en-US" smtClean="0"/>
+              <a:rPr lang="en-US"/>
               <a:t>Second level</a:t>
             </a:r>
           </a:p>
           <a:p>
             <a:pPr lvl="2"/>
             <a:r>
-              <a:rPr lang="en-US" smtClean="0"/>
+              <a:rPr lang="en-US"/>
               <a:t>Third level</a:t>
             </a:r>
           </a:p>
           <a:p>
             <a:pPr lvl="3"/>
             <a:r>
-              <a:rPr lang="en-US" smtClean="0"/>
+              <a:rPr lang="en-US"/>
               <a:t>Fourth level</a:t>
             </a:r>
           </a:p>
           <a:p>
             <a:pPr lvl="4"/>
             <a:r>
-              <a:rPr lang="en-US" smtClean="0"/>
+              <a:rPr lang="en-US"/>
               <a:t>Fifth level</a:t>
             </a:r>
-            <a:endParaRPr lang="en-US"/>
           </a:p>
         </p:txBody>
       </p:sp>
@@ -498,10 +517,9 @@
           <a:lstStyle/>
           <a:p>
             <a:r>
-              <a:rPr lang="en-US" smtClean="0"/>
+              <a:rPr lang="en-US"/>
               <a:t>Click to edit Master title style</a:t>
             </a:r>
-            <a:endParaRPr lang="en-US"/>
           </a:p>
         </p:txBody>
       </p:sp>
@@ -617,10 +635,9 @@
           </a:lstStyle>
           <a:p>
             <a:r>
-              <a:rPr lang="en-US" smtClean="0"/>
+              <a:rPr lang="en-US"/>
               <a:t>Click to edit Master subtitle style</a:t>
             </a:r>
-            <a:endParaRPr lang="en-US"/>
           </a:p>
         </p:txBody>
       </p:sp>
@@ -641,7 +658,7 @@
           <a:p>
             <a:fld id="{78C97017-6FC3-485B-9764-EAC9E56C1D49}" type="datetimeFigureOut">
               <a:rPr lang="en-US" smtClean="0"/>
-              <a:t>10/16/2016</a:t>
+              <a:t>10/7/2017</a:t>
             </a:fld>
             <a:endParaRPr lang="en-US"/>
           </a:p>
@@ -735,10 +752,9 @@
           <a:lstStyle/>
           <a:p>
             <a:r>
-              <a:rPr lang="en-US" smtClean="0"/>
+              <a:rPr lang="en-US"/>
               <a:t>Click to edit Master title style</a:t>
             </a:r>
-            <a:endParaRPr lang="en-US"/>
           </a:p>
         </p:txBody>
       </p:sp>
@@ -759,38 +775,37 @@
           <a:p>
             <a:pPr lvl="0"/>
             <a:r>
-              <a:rPr lang="en-US" smtClean="0"/>
+              <a:rPr lang="en-US"/>
               <a:t>Click to edit Master text styles</a:t>
             </a:r>
           </a:p>
           <a:p>
             <a:pPr lvl="1"/>
             <a:r>
-              <a:rPr lang="en-US" smtClean="0"/>
+              <a:rPr lang="en-US"/>
               <a:t>Second level</a:t>
             </a:r>
           </a:p>
           <a:p>
             <a:pPr lvl="2"/>
             <a:r>
-              <a:rPr lang="en-US" smtClean="0"/>
+              <a:rPr lang="en-US"/>
               <a:t>Third level</a:t>
             </a:r>
           </a:p>
           <a:p>
             <a:pPr lvl="3"/>
             <a:r>
-              <a:rPr lang="en-US" smtClean="0"/>
+              <a:rPr lang="en-US"/>
               <a:t>Fourth level</a:t>
             </a:r>
           </a:p>
           <a:p>
             <a:pPr lvl="4"/>
             <a:r>
-              <a:rPr lang="en-US" smtClean="0"/>
+              <a:rPr lang="en-US"/>
               <a:t>Fifth level</a:t>
             </a:r>
-            <a:endParaRPr lang="en-US"/>
           </a:p>
         </p:txBody>
       </p:sp>
@@ -811,7 +826,7 @@
           <a:p>
             <a:fld id="{78C97017-6FC3-485B-9764-EAC9E56C1D49}" type="datetimeFigureOut">
               <a:rPr lang="en-US" smtClean="0"/>
-              <a:t>10/16/2016</a:t>
+              <a:t>10/7/2017</a:t>
             </a:fld>
             <a:endParaRPr lang="en-US"/>
           </a:p>
@@ -910,10 +925,9 @@
           <a:lstStyle/>
           <a:p>
             <a:r>
-              <a:rPr lang="en-US" smtClean="0"/>
+              <a:rPr lang="en-US"/>
               <a:t>Click to edit Master title style</a:t>
             </a:r>
-            <a:endParaRPr lang="en-US"/>
           </a:p>
         </p:txBody>
       </p:sp>
@@ -939,38 +953,37 @@
           <a:p>
             <a:pPr lvl="0"/>
             <a:r>
-              <a:rPr lang="en-US" smtClean="0"/>
+              <a:rPr lang="en-US"/>
               <a:t>Click to edit Master text styles</a:t>
             </a:r>
           </a:p>
           <a:p>
             <a:pPr lvl="1"/>
             <a:r>
-              <a:rPr lang="en-US" smtClean="0"/>
+              <a:rPr lang="en-US"/>
               <a:t>Second level</a:t>
             </a:r>
           </a:p>
           <a:p>
             <a:pPr lvl="2"/>
             <a:r>
-              <a:rPr lang="en-US" smtClean="0"/>
+              <a:rPr lang="en-US"/>
               <a:t>Third level</a:t>
             </a:r>
           </a:p>
           <a:p>
             <a:pPr lvl="3"/>
             <a:r>
-              <a:rPr lang="en-US" smtClean="0"/>
+              <a:rPr lang="en-US"/>
               <a:t>Fourth level</a:t>
             </a:r>
           </a:p>
           <a:p>
             <a:pPr lvl="4"/>
             <a:r>
-              <a:rPr lang="en-US" smtClean="0"/>
+              <a:rPr lang="en-US"/>
               <a:t>Fifth level</a:t>
             </a:r>
-            <a:endParaRPr lang="en-US"/>
           </a:p>
         </p:txBody>
       </p:sp>
@@ -991,7 +1004,7 @@
           <a:p>
             <a:fld id="{78C97017-6FC3-485B-9764-EAC9E56C1D49}" type="datetimeFigureOut">
               <a:rPr lang="en-US" smtClean="0"/>
-              <a:t>10/16/2016</a:t>
+              <a:t>10/7/2017</a:t>
             </a:fld>
             <a:endParaRPr lang="en-US"/>
           </a:p>
@@ -1085,10 +1098,9 @@
           <a:lstStyle/>
           <a:p>
             <a:r>
-              <a:rPr lang="en-US" smtClean="0"/>
+              <a:rPr lang="en-US"/>
               <a:t>Click to edit Master title style</a:t>
             </a:r>
-            <a:endParaRPr lang="en-US"/>
           </a:p>
         </p:txBody>
       </p:sp>
@@ -1109,38 +1121,37 @@
           <a:p>
             <a:pPr lvl="0"/>
             <a:r>
-              <a:rPr lang="en-US" smtClean="0"/>
+              <a:rPr lang="en-US"/>
               <a:t>Click to edit Master text styles</a:t>
             </a:r>
           </a:p>
           <a:p>
             <a:pPr lvl="1"/>
             <a:r>
-              <a:rPr lang="en-US" smtClean="0"/>
+              <a:rPr lang="en-US"/>
               <a:t>Second level</a:t>
             </a:r>
           </a:p>
           <a:p>
             <a:pPr lvl="2"/>
             <a:r>
-              <a:rPr lang="en-US" smtClean="0"/>
+              <a:rPr lang="en-US"/>
               <a:t>Third level</a:t>
             </a:r>
           </a:p>
           <a:p>
             <a:pPr lvl="3"/>
             <a:r>
-              <a:rPr lang="en-US" smtClean="0"/>
+              <a:rPr lang="en-US"/>
               <a:t>Fourth level</a:t>
             </a:r>
           </a:p>
           <a:p>
             <a:pPr lvl="4"/>
             <a:r>
-              <a:rPr lang="en-US" smtClean="0"/>
+              <a:rPr lang="en-US"/>
               <a:t>Fifth level</a:t>
             </a:r>
-            <a:endParaRPr lang="en-US"/>
           </a:p>
         </p:txBody>
       </p:sp>
@@ -1161,7 +1172,7 @@
           <a:p>
             <a:fld id="{78C97017-6FC3-485B-9764-EAC9E56C1D49}" type="datetimeFigureOut">
               <a:rPr lang="en-US" smtClean="0"/>
-              <a:t>10/16/2016</a:t>
+              <a:t>10/7/2017</a:t>
             </a:fld>
             <a:endParaRPr lang="en-US"/>
           </a:p>
@@ -1264,10 +1275,9 @@
           </a:lstStyle>
           <a:p>
             <a:r>
-              <a:rPr lang="en-US" smtClean="0"/>
+              <a:rPr lang="en-US"/>
               <a:t>Click to edit Master title style</a:t>
             </a:r>
-            <a:endParaRPr lang="en-US"/>
           </a:p>
         </p:txBody>
       </p:sp>
@@ -1384,7 +1394,7 @@
           <a:p>
             <a:pPr lvl="0"/>
             <a:r>
-              <a:rPr lang="en-US" smtClean="0"/>
+              <a:rPr lang="en-US"/>
               <a:t>Click to edit Master text styles</a:t>
             </a:r>
           </a:p>
@@ -1407,7 +1417,7 @@
           <a:p>
             <a:fld id="{78C97017-6FC3-485B-9764-EAC9E56C1D49}" type="datetimeFigureOut">
               <a:rPr lang="en-US" smtClean="0"/>
-              <a:t>10/16/2016</a:t>
+              <a:t>10/7/2017</a:t>
             </a:fld>
             <a:endParaRPr lang="en-US"/>
           </a:p>
@@ -1501,10 +1511,9 @@
           <a:lstStyle/>
           <a:p>
             <a:r>
-              <a:rPr lang="en-US" smtClean="0"/>
+              <a:rPr lang="en-US"/>
               <a:t>Click to edit Master title style</a:t>
             </a:r>
-            <a:endParaRPr lang="en-US"/>
           </a:p>
         </p:txBody>
       </p:sp>
@@ -1558,38 +1567,37 @@
           <a:p>
             <a:pPr lvl="0"/>
             <a:r>
-              <a:rPr lang="en-US" smtClean="0"/>
+              <a:rPr lang="en-US"/>
               <a:t>Click to edit Master text styles</a:t>
             </a:r>
           </a:p>
           <a:p>
             <a:pPr lvl="1"/>
             <a:r>
-              <a:rPr lang="en-US" smtClean="0"/>
+              <a:rPr lang="en-US"/>
               <a:t>Second level</a:t>
             </a:r>
           </a:p>
           <a:p>
             <a:pPr lvl="2"/>
             <a:r>
-              <a:rPr lang="en-US" smtClean="0"/>
+              <a:rPr lang="en-US"/>
               <a:t>Third level</a:t>
             </a:r>
           </a:p>
           <a:p>
             <a:pPr lvl="3"/>
             <a:r>
-              <a:rPr lang="en-US" smtClean="0"/>
+              <a:rPr lang="en-US"/>
               <a:t>Fourth level</a:t>
             </a:r>
           </a:p>
           <a:p>
             <a:pPr lvl="4"/>
             <a:r>
-              <a:rPr lang="en-US" smtClean="0"/>
+              <a:rPr lang="en-US"/>
               <a:t>Fifth level</a:t>
             </a:r>
-            <a:endParaRPr lang="en-US"/>
           </a:p>
         </p:txBody>
       </p:sp>
@@ -1643,38 +1651,37 @@
           <a:p>
             <a:pPr lvl="0"/>
             <a:r>
-              <a:rPr lang="en-US" smtClean="0"/>
+              <a:rPr lang="en-US"/>
               <a:t>Click to edit Master text styles</a:t>
             </a:r>
           </a:p>
           <a:p>
             <a:pPr lvl="1"/>
             <a:r>
-              <a:rPr lang="en-US" smtClean="0"/>
+              <a:rPr lang="en-US"/>
               <a:t>Second level</a:t>
             </a:r>
           </a:p>
           <a:p>
             <a:pPr lvl="2"/>
             <a:r>
-              <a:rPr lang="en-US" smtClean="0"/>
+              <a:rPr lang="en-US"/>
               <a:t>Third level</a:t>
             </a:r>
           </a:p>
           <a:p>
             <a:pPr lvl="3"/>
             <a:r>
-              <a:rPr lang="en-US" smtClean="0"/>
+              <a:rPr lang="en-US"/>
               <a:t>Fourth level</a:t>
             </a:r>
           </a:p>
           <a:p>
             <a:pPr lvl="4"/>
             <a:r>
-              <a:rPr lang="en-US" smtClean="0"/>
+              <a:rPr lang="en-US"/>
               <a:t>Fifth level</a:t>
             </a:r>
-            <a:endParaRPr lang="en-US"/>
           </a:p>
         </p:txBody>
       </p:sp>
@@ -1695,7 +1702,7 @@
           <a:p>
             <a:fld id="{78C97017-6FC3-485B-9764-EAC9E56C1D49}" type="datetimeFigureOut">
               <a:rPr lang="en-US" smtClean="0"/>
-              <a:t>10/16/2016</a:t>
+              <a:t>10/7/2017</a:t>
             </a:fld>
             <a:endParaRPr lang="en-US"/>
           </a:p>
@@ -1793,10 +1800,9 @@
           </a:lstStyle>
           <a:p>
             <a:r>
-              <a:rPr lang="en-US" smtClean="0"/>
+              <a:rPr lang="en-US"/>
               <a:t>Click to edit Master title style</a:t>
             </a:r>
-            <a:endParaRPr lang="en-US"/>
           </a:p>
         </p:txBody>
       </p:sp>
@@ -1859,7 +1865,7 @@
           <a:p>
             <a:pPr lvl="0"/>
             <a:r>
-              <a:rPr lang="en-US" smtClean="0"/>
+              <a:rPr lang="en-US"/>
               <a:t>Click to edit Master text styles</a:t>
             </a:r>
           </a:p>
@@ -1915,38 +1921,37 @@
           <a:p>
             <a:pPr lvl="0"/>
             <a:r>
-              <a:rPr lang="en-US" smtClean="0"/>
+              <a:rPr lang="en-US"/>
               <a:t>Click to edit Master text styles</a:t>
             </a:r>
           </a:p>
           <a:p>
             <a:pPr lvl="1"/>
             <a:r>
-              <a:rPr lang="en-US" smtClean="0"/>
+              <a:rPr lang="en-US"/>
               <a:t>Second level</a:t>
             </a:r>
           </a:p>
           <a:p>
             <a:pPr lvl="2"/>
             <a:r>
-              <a:rPr lang="en-US" smtClean="0"/>
+              <a:rPr lang="en-US"/>
               <a:t>Third level</a:t>
             </a:r>
           </a:p>
           <a:p>
             <a:pPr lvl="3"/>
             <a:r>
-              <a:rPr lang="en-US" smtClean="0"/>
+              <a:rPr lang="en-US"/>
               <a:t>Fourth level</a:t>
             </a:r>
           </a:p>
           <a:p>
             <a:pPr lvl="4"/>
             <a:r>
-              <a:rPr lang="en-US" smtClean="0"/>
+              <a:rPr lang="en-US"/>
               <a:t>Fifth level</a:t>
             </a:r>
-            <a:endParaRPr lang="en-US"/>
           </a:p>
         </p:txBody>
       </p:sp>
@@ -2009,7 +2014,7 @@
           <a:p>
             <a:pPr lvl="0"/>
             <a:r>
-              <a:rPr lang="en-US" smtClean="0"/>
+              <a:rPr lang="en-US"/>
               <a:t>Click to edit Master text styles</a:t>
             </a:r>
           </a:p>
@@ -2065,38 +2070,37 @@
           <a:p>
             <a:pPr lvl="0"/>
             <a:r>
-              <a:rPr lang="en-US" smtClean="0"/>
+              <a:rPr lang="en-US"/>
               <a:t>Click to edit Master text styles</a:t>
             </a:r>
           </a:p>
           <a:p>
             <a:pPr lvl="1"/>
             <a:r>
-              <a:rPr lang="en-US" smtClean="0"/>
+              <a:rPr lang="en-US"/>
               <a:t>Second level</a:t>
             </a:r>
           </a:p>
           <a:p>
             <a:pPr lvl="2"/>
             <a:r>
-              <a:rPr lang="en-US" smtClean="0"/>
+              <a:rPr lang="en-US"/>
               <a:t>Third level</a:t>
             </a:r>
           </a:p>
           <a:p>
             <a:pPr lvl="3"/>
             <a:r>
-              <a:rPr lang="en-US" smtClean="0"/>
+              <a:rPr lang="en-US"/>
               <a:t>Fourth level</a:t>
             </a:r>
           </a:p>
           <a:p>
             <a:pPr lvl="4"/>
             <a:r>
-              <a:rPr lang="en-US" smtClean="0"/>
+              <a:rPr lang="en-US"/>
               <a:t>Fifth level</a:t>
             </a:r>
-            <a:endParaRPr lang="en-US"/>
           </a:p>
         </p:txBody>
       </p:sp>
@@ -2117,7 +2121,7 @@
           <a:p>
             <a:fld id="{78C97017-6FC3-485B-9764-EAC9E56C1D49}" type="datetimeFigureOut">
               <a:rPr lang="en-US" smtClean="0"/>
-              <a:t>10/16/2016</a:t>
+              <a:t>10/7/2017</a:t>
             </a:fld>
             <a:endParaRPr lang="en-US"/>
           </a:p>
@@ -2211,10 +2215,9 @@
           <a:lstStyle/>
           <a:p>
             <a:r>
-              <a:rPr lang="en-US" smtClean="0"/>
+              <a:rPr lang="en-US"/>
               <a:t>Click to edit Master title style</a:t>
             </a:r>
-            <a:endParaRPr lang="en-US"/>
           </a:p>
         </p:txBody>
       </p:sp>
@@ -2235,7 +2238,7 @@
           <a:p>
             <a:fld id="{78C97017-6FC3-485B-9764-EAC9E56C1D49}" type="datetimeFigureOut">
               <a:rPr lang="en-US" smtClean="0"/>
-              <a:t>10/16/2016</a:t>
+              <a:t>10/7/2017</a:t>
             </a:fld>
             <a:endParaRPr lang="en-US"/>
           </a:p>
@@ -2330,7 +2333,7 @@
           <a:p>
             <a:fld id="{78C97017-6FC3-485B-9764-EAC9E56C1D49}" type="datetimeFigureOut">
               <a:rPr lang="en-US" smtClean="0"/>
-              <a:t>10/16/2016</a:t>
+              <a:t>10/7/2017</a:t>
             </a:fld>
             <a:endParaRPr lang="en-US"/>
           </a:p>
@@ -2433,10 +2436,9 @@
           </a:lstStyle>
           <a:p>
             <a:r>
-              <a:rPr lang="en-US" smtClean="0"/>
+              <a:rPr lang="en-US"/>
               <a:t>Click to edit Master title style</a:t>
             </a:r>
-            <a:endParaRPr lang="en-US"/>
           </a:p>
         </p:txBody>
       </p:sp>
@@ -2490,38 +2492,37 @@
           <a:p>
             <a:pPr lvl="0"/>
             <a:r>
-              <a:rPr lang="en-US" smtClean="0"/>
+              <a:rPr lang="en-US"/>
               <a:t>Click to edit Master text styles</a:t>
             </a:r>
           </a:p>
           <a:p>
             <a:pPr lvl="1"/>
             <a:r>
-              <a:rPr lang="en-US" smtClean="0"/>
+              <a:rPr lang="en-US"/>
               <a:t>Second level</a:t>
             </a:r>
           </a:p>
           <a:p>
             <a:pPr lvl="2"/>
             <a:r>
-              <a:rPr lang="en-US" smtClean="0"/>
+              <a:rPr lang="en-US"/>
               <a:t>Third level</a:t>
             </a:r>
           </a:p>
           <a:p>
             <a:pPr lvl="3"/>
             <a:r>
-              <a:rPr lang="en-US" smtClean="0"/>
+              <a:rPr lang="en-US"/>
               <a:t>Fourth level</a:t>
             </a:r>
           </a:p>
           <a:p>
             <a:pPr lvl="4"/>
             <a:r>
-              <a:rPr lang="en-US" smtClean="0"/>
+              <a:rPr lang="en-US"/>
               <a:t>Fifth level</a:t>
             </a:r>
-            <a:endParaRPr lang="en-US"/>
           </a:p>
         </p:txBody>
       </p:sp>
@@ -2584,7 +2585,7 @@
           <a:p>
             <a:pPr lvl="0"/>
             <a:r>
-              <a:rPr lang="en-US" smtClean="0"/>
+              <a:rPr lang="en-US"/>
               <a:t>Click to edit Master text styles</a:t>
             </a:r>
           </a:p>
@@ -2607,7 +2608,7 @@
           <a:p>
             <a:fld id="{78C97017-6FC3-485B-9764-EAC9E56C1D49}" type="datetimeFigureOut">
               <a:rPr lang="en-US" smtClean="0"/>
-              <a:t>10/16/2016</a:t>
+              <a:t>10/7/2017</a:t>
             </a:fld>
             <a:endParaRPr lang="en-US"/>
           </a:p>
@@ -2710,10 +2711,9 @@
           </a:lstStyle>
           <a:p>
             <a:r>
-              <a:rPr lang="en-US" smtClean="0"/>
+              <a:rPr lang="en-US"/>
               <a:t>Click to edit Master title style</a:t>
             </a:r>
-            <a:endParaRPr lang="en-US"/>
           </a:p>
         </p:txBody>
       </p:sp>
@@ -2837,7 +2837,7 @@
           <a:p>
             <a:pPr lvl="0"/>
             <a:r>
-              <a:rPr lang="en-US" smtClean="0"/>
+              <a:rPr lang="en-US"/>
               <a:t>Click to edit Master text styles</a:t>
             </a:r>
           </a:p>
@@ -2860,7 +2860,7 @@
           <a:p>
             <a:fld id="{78C97017-6FC3-485B-9764-EAC9E56C1D49}" type="datetimeFigureOut">
               <a:rPr lang="en-US" smtClean="0"/>
-              <a:t>10/16/2016</a:t>
+              <a:t>10/7/2017</a:t>
             </a:fld>
             <a:endParaRPr lang="en-US"/>
           </a:p>
@@ -2969,10 +2969,9 @@
           <a:lstStyle/>
           <a:p>
             <a:r>
-              <a:rPr lang="en-US" smtClean="0"/>
+              <a:rPr lang="en-US"/>
               <a:t>Click to edit Master title style</a:t>
             </a:r>
-            <a:endParaRPr lang="en-US"/>
           </a:p>
         </p:txBody>
       </p:sp>
@@ -3003,38 +3002,37 @@
           <a:p>
             <a:pPr lvl="0"/>
             <a:r>
-              <a:rPr lang="en-US" smtClean="0"/>
+              <a:rPr lang="en-US"/>
               <a:t>Click to edit Master text styles</a:t>
             </a:r>
           </a:p>
           <a:p>
             <a:pPr lvl="1"/>
             <a:r>
-              <a:rPr lang="en-US" smtClean="0"/>
+              <a:rPr lang="en-US"/>
               <a:t>Second level</a:t>
             </a:r>
           </a:p>
           <a:p>
             <a:pPr lvl="2"/>
             <a:r>
-              <a:rPr lang="en-US" smtClean="0"/>
+              <a:rPr lang="en-US"/>
               <a:t>Third level</a:t>
             </a:r>
           </a:p>
           <a:p>
             <a:pPr lvl="3"/>
             <a:r>
-              <a:rPr lang="en-US" smtClean="0"/>
+              <a:rPr lang="en-US"/>
               <a:t>Fourth level</a:t>
             </a:r>
           </a:p>
           <a:p>
             <a:pPr lvl="4"/>
             <a:r>
-              <a:rPr lang="en-US" smtClean="0"/>
+              <a:rPr lang="en-US"/>
               <a:t>Fifth level</a:t>
             </a:r>
-            <a:endParaRPr lang="en-US"/>
           </a:p>
         </p:txBody>
       </p:sp>
@@ -3073,7 +3071,7 @@
           <a:p>
             <a:fld id="{78C97017-6FC3-485B-9764-EAC9E56C1D49}" type="datetimeFigureOut">
               <a:rPr lang="en-US" smtClean="0"/>
-              <a:t>10/16/2016</a:t>
+              <a:t>10/7/2017</a:t>
             </a:fld>
             <a:endParaRPr lang="en-US"/>
           </a:p>
@@ -3546,7 +3544,7 @@
           <a:p>
             <a:pPr algn="ctr"/>
             <a:r>
-              <a:rPr lang="en-US" sz="1600" dirty="0" smtClean="0">
+              <a:rPr lang="en-US" sz="1600" dirty="0">
                 <a:solidFill>
                   <a:schemeClr val="bg1"/>
                 </a:solidFill>
@@ -3605,7 +3603,7 @@
           <a:p>
             <a:pPr algn="ctr"/>
             <a:r>
-              <a:rPr lang="en-US" sz="1600" dirty="0" smtClean="0">
+              <a:rPr lang="en-US" sz="1600" dirty="0">
                 <a:solidFill>
                   <a:schemeClr val="bg1"/>
                 </a:solidFill>
@@ -3668,7 +3666,7 @@
           <a:p>
             <a:pPr algn="ctr"/>
             <a:r>
-              <a:rPr lang="en-US" sz="1600" dirty="0" smtClean="0">
+              <a:rPr lang="en-US" sz="1600" dirty="0">
                 <a:solidFill>
                   <a:schemeClr val="bg1"/>
                 </a:solidFill>
@@ -3727,7 +3725,7 @@
           <a:p>
             <a:pPr algn="ctr"/>
             <a:r>
-              <a:rPr lang="en-US" sz="1600" dirty="0" smtClean="0">
+              <a:rPr lang="en-US" sz="1600" dirty="0">
                 <a:solidFill>
                   <a:schemeClr val="bg1"/>
                 </a:solidFill>
@@ -4182,7 +4180,7 @@
         </p:nvSpPr>
         <p:spPr>
           <a:xfrm>
-            <a:off x="2650069" y="1447800"/>
+            <a:off x="2535770" y="1019399"/>
             <a:ext cx="914400" cy="533400"/>
           </a:xfrm>
           <a:prstGeom prst="cloud">
@@ -4233,15 +4231,15 @@
         <p:nvCxnSpPr>
           <p:cNvPr id="52" name="Elbow Connector 51"/>
           <p:cNvCxnSpPr>
-            <a:stCxn id="2" idx="0"/>
+            <a:cxnSpLocks/>
             <a:endCxn id="51" idx="2"/>
           </p:cNvCxnSpPr>
           <p:nvPr/>
         </p:nvCxnSpPr>
         <p:spPr>
           <a:xfrm rot="5400000" flipH="1" flipV="1">
-            <a:off x="2222648" y="1760922"/>
-            <a:ext cx="476678" cy="383835"/>
+            <a:off x="2199213" y="1394057"/>
+            <a:ext cx="447351" cy="231436"/>
           </a:xfrm>
           <a:prstGeom prst="bentConnector2">
             <a:avLst/>
@@ -4313,7 +4311,7 @@
           <a:p>
             <a:pPr algn="ctr"/>
             <a:r>
-              <a:rPr lang="en-US" sz="1600" dirty="0" smtClean="0">
+              <a:rPr lang="en-US" sz="1600" dirty="0">
                 <a:solidFill>
                   <a:schemeClr val="bg1"/>
                 </a:solidFill>
@@ -4664,7 +4662,7 @@
           <a:p>
             <a:pPr algn="ctr"/>
             <a:r>
-              <a:rPr lang="en-US" sz="1600" dirty="0" smtClean="0">
+              <a:rPr lang="en-US" sz="1600" dirty="0">
                 <a:solidFill>
                   <a:schemeClr val="bg1"/>
                 </a:solidFill>
@@ -4672,25 +4670,20 @@
               <a:t>Logs</a:t>
             </a:r>
             <a:br>
-              <a:rPr lang="en-US" sz="1600" dirty="0" smtClean="0">
+              <a:rPr lang="en-US" sz="1600" dirty="0">
                 <a:solidFill>
                   <a:schemeClr val="bg1"/>
                 </a:solidFill>
               </a:rPr>
             </a:br>
             <a:r>
-              <a:rPr lang="en-US" sz="1600" dirty="0" smtClean="0">
+              <a:rPr lang="en-US" sz="1600" dirty="0">
                 <a:solidFill>
                   <a:schemeClr val="bg1"/>
                 </a:solidFill>
               </a:rPr>
               <a:t>Center</a:t>
             </a:r>
-            <a:endParaRPr lang="en-US" sz="1600" dirty="0">
-              <a:solidFill>
-                <a:schemeClr val="bg1"/>
-              </a:solidFill>
-            </a:endParaRPr>
           </a:p>
         </p:txBody>
       </p:sp>
@@ -4773,6 +4766,80 @@
           </a:fontRef>
         </p:style>
       </p:cxnSp>
+      <p:sp>
+        <p:nvSpPr>
+          <p:cNvPr id="18" name="TextBox 17">
+            <a:extLst>
+              <a:ext uri="{FF2B5EF4-FFF2-40B4-BE49-F238E27FC236}">
+                <a16:creationId xmlns:a16="http://schemas.microsoft.com/office/drawing/2014/main" id="{092C5B48-D6FB-4259-959F-FB2DF2B4D579}"/>
+              </a:ext>
+            </a:extLst>
+          </p:cNvPr>
+          <p:cNvSpPr txBox="1"/>
+          <p:nvPr/>
+        </p:nvSpPr>
+        <p:spPr>
+          <a:xfrm>
+            <a:off x="1134131" y="1642540"/>
+            <a:ext cx="1295400" cy="338554"/>
+          </a:xfrm>
+          <a:prstGeom prst="rect">
+            <a:avLst/>
+          </a:prstGeom>
+          <a:noFill/>
+        </p:spPr>
+        <p:txBody>
+          <a:bodyPr wrap="square" rtlCol="0">
+            <a:spAutoFit/>
+          </a:bodyPr>
+          <a:lstStyle/>
+          <a:p>
+            <a:r>
+              <a:rPr lang="en-US" sz="1600" dirty="0"/>
+              <a:t>temporarily</a:t>
+            </a:r>
+          </a:p>
+        </p:txBody>
+      </p:sp>
+      <p:sp>
+        <p:nvSpPr>
+          <p:cNvPr id="20" name="TextBox 19">
+            <a:extLst>
+              <a:ext uri="{FF2B5EF4-FFF2-40B4-BE49-F238E27FC236}">
+                <a16:creationId xmlns:a16="http://schemas.microsoft.com/office/drawing/2014/main" id="{A240DA6F-B5B0-4463-97A3-82B173005334}"/>
+              </a:ext>
+            </a:extLst>
+          </p:cNvPr>
+          <p:cNvSpPr txBox="1"/>
+          <p:nvPr/>
+        </p:nvSpPr>
+        <p:spPr>
+          <a:xfrm>
+            <a:off x="2137840" y="1521704"/>
+            <a:ext cx="527821" cy="523220"/>
+          </a:xfrm>
+          <a:prstGeom prst="rect">
+            <a:avLst/>
+          </a:prstGeom>
+          <a:noFill/>
+        </p:spPr>
+        <p:txBody>
+          <a:bodyPr wrap="square" rtlCol="0">
+            <a:spAutoFit/>
+          </a:bodyPr>
+          <a:lstStyle/>
+          <a:p>
+            <a:r>
+              <a:rPr lang="en-US" sz="2800" dirty="0">
+                <a:solidFill>
+                  <a:srgbClr val="00B050"/>
+                </a:solidFill>
+              </a:rPr>
+              <a:t>x</a:t>
+            </a:r>
+          </a:p>
+        </p:txBody>
+      </p:sp>
     </p:spTree>
     <p:extLst>
       <p:ext uri="{BB962C8B-B14F-4D97-AF65-F5344CB8AC3E}">

</xml_diff>

<commit_message>
Docs: Update architecture diagram to show web use
</commit_message>
<xml_diff>
--- a/docs/diagrams/ArchitectureDiagram.pptx
+++ b/docs/diagrams/ArchitectureDiagram.pptx
@@ -212,7 +212,7 @@
           <a:p>
             <a:fld id="{F5CC4B3F-88C1-4FFA-B1B6-F41C21DC6924}" type="datetimeFigureOut">
               <a:rPr lang="en-US" smtClean="0"/>
-              <a:t>10/7/2017</a:t>
+              <a:t>11/12/2017</a:t>
             </a:fld>
             <a:endParaRPr lang="en-US"/>
           </a:p>
@@ -658,7 +658,7 @@
           <a:p>
             <a:fld id="{78C97017-6FC3-485B-9764-EAC9E56C1D49}" type="datetimeFigureOut">
               <a:rPr lang="en-US" smtClean="0"/>
-              <a:t>10/7/2017</a:t>
+              <a:t>11/12/2017</a:t>
             </a:fld>
             <a:endParaRPr lang="en-US"/>
           </a:p>
@@ -826,7 +826,7 @@
           <a:p>
             <a:fld id="{78C97017-6FC3-485B-9764-EAC9E56C1D49}" type="datetimeFigureOut">
               <a:rPr lang="en-US" smtClean="0"/>
-              <a:t>10/7/2017</a:t>
+              <a:t>11/12/2017</a:t>
             </a:fld>
             <a:endParaRPr lang="en-US"/>
           </a:p>
@@ -1004,7 +1004,7 @@
           <a:p>
             <a:fld id="{78C97017-6FC3-485B-9764-EAC9E56C1D49}" type="datetimeFigureOut">
               <a:rPr lang="en-US" smtClean="0"/>
-              <a:t>10/7/2017</a:t>
+              <a:t>11/12/2017</a:t>
             </a:fld>
             <a:endParaRPr lang="en-US"/>
           </a:p>
@@ -1172,7 +1172,7 @@
           <a:p>
             <a:fld id="{78C97017-6FC3-485B-9764-EAC9E56C1D49}" type="datetimeFigureOut">
               <a:rPr lang="en-US" smtClean="0"/>
-              <a:t>10/7/2017</a:t>
+              <a:t>11/12/2017</a:t>
             </a:fld>
             <a:endParaRPr lang="en-US"/>
           </a:p>
@@ -1417,7 +1417,7 @@
           <a:p>
             <a:fld id="{78C97017-6FC3-485B-9764-EAC9E56C1D49}" type="datetimeFigureOut">
               <a:rPr lang="en-US" smtClean="0"/>
-              <a:t>10/7/2017</a:t>
+              <a:t>11/12/2017</a:t>
             </a:fld>
             <a:endParaRPr lang="en-US"/>
           </a:p>
@@ -1702,7 +1702,7 @@
           <a:p>
             <a:fld id="{78C97017-6FC3-485B-9764-EAC9E56C1D49}" type="datetimeFigureOut">
               <a:rPr lang="en-US" smtClean="0"/>
-              <a:t>10/7/2017</a:t>
+              <a:t>11/12/2017</a:t>
             </a:fld>
             <a:endParaRPr lang="en-US"/>
           </a:p>
@@ -2121,7 +2121,7 @@
           <a:p>
             <a:fld id="{78C97017-6FC3-485B-9764-EAC9E56C1D49}" type="datetimeFigureOut">
               <a:rPr lang="en-US" smtClean="0"/>
-              <a:t>10/7/2017</a:t>
+              <a:t>11/12/2017</a:t>
             </a:fld>
             <a:endParaRPr lang="en-US"/>
           </a:p>
@@ -2238,7 +2238,7 @@
           <a:p>
             <a:fld id="{78C97017-6FC3-485B-9764-EAC9E56C1D49}" type="datetimeFigureOut">
               <a:rPr lang="en-US" smtClean="0"/>
-              <a:t>10/7/2017</a:t>
+              <a:t>11/12/2017</a:t>
             </a:fld>
             <a:endParaRPr lang="en-US"/>
           </a:p>
@@ -2333,7 +2333,7 @@
           <a:p>
             <a:fld id="{78C97017-6FC3-485B-9764-EAC9E56C1D49}" type="datetimeFigureOut">
               <a:rPr lang="en-US" smtClean="0"/>
-              <a:t>10/7/2017</a:t>
+              <a:t>11/12/2017</a:t>
             </a:fld>
             <a:endParaRPr lang="en-US"/>
           </a:p>
@@ -2608,7 +2608,7 @@
           <a:p>
             <a:fld id="{78C97017-6FC3-485B-9764-EAC9E56C1D49}" type="datetimeFigureOut">
               <a:rPr lang="en-US" smtClean="0"/>
-              <a:t>10/7/2017</a:t>
+              <a:t>11/12/2017</a:t>
             </a:fld>
             <a:endParaRPr lang="en-US"/>
           </a:p>
@@ -2860,7 +2860,7 @@
           <a:p>
             <a:fld id="{78C97017-6FC3-485B-9764-EAC9E56C1D49}" type="datetimeFigureOut">
               <a:rPr lang="en-US" smtClean="0"/>
-              <a:t>10/7/2017</a:t>
+              <a:t>11/12/2017</a:t>
             </a:fld>
             <a:endParaRPr lang="en-US"/>
           </a:p>
@@ -3071,7 +3071,7 @@
           <a:p>
             <a:fld id="{78C97017-6FC3-485B-9764-EAC9E56C1D49}" type="datetimeFigureOut">
               <a:rPr lang="en-US" smtClean="0"/>
-              <a:t>10/7/2017</a:t>
+              <a:t>11/12/2017</a:t>
             </a:fld>
             <a:endParaRPr lang="en-US"/>
           </a:p>
@@ -4232,14 +4232,15 @@
           <p:cNvPr id="52" name="Elbow Connector 51"/>
           <p:cNvCxnSpPr>
             <a:cxnSpLocks/>
+            <a:stCxn id="2" idx="0"/>
             <a:endCxn id="51" idx="2"/>
           </p:cNvCxnSpPr>
           <p:nvPr/>
         </p:nvCxnSpPr>
         <p:spPr>
           <a:xfrm rot="5400000" flipH="1" flipV="1">
-            <a:off x="2199213" y="1394057"/>
-            <a:ext cx="447351" cy="231436"/>
+            <a:off x="1951299" y="1603871"/>
+            <a:ext cx="905079" cy="269536"/>
           </a:xfrm>
           <a:prstGeom prst="bentConnector2">
             <a:avLst/>
@@ -4766,80 +4767,6 @@
           </a:fontRef>
         </p:style>
       </p:cxnSp>
-      <p:sp>
-        <p:nvSpPr>
-          <p:cNvPr id="18" name="TextBox 17">
-            <a:extLst>
-              <a:ext uri="{FF2B5EF4-FFF2-40B4-BE49-F238E27FC236}">
-                <a16:creationId xmlns:a16="http://schemas.microsoft.com/office/drawing/2014/main" id="{092C5B48-D6FB-4259-959F-FB2DF2B4D579}"/>
-              </a:ext>
-            </a:extLst>
-          </p:cNvPr>
-          <p:cNvSpPr txBox="1"/>
-          <p:nvPr/>
-        </p:nvSpPr>
-        <p:spPr>
-          <a:xfrm>
-            <a:off x="1134131" y="1642540"/>
-            <a:ext cx="1295400" cy="338554"/>
-          </a:xfrm>
-          <a:prstGeom prst="rect">
-            <a:avLst/>
-          </a:prstGeom>
-          <a:noFill/>
-        </p:spPr>
-        <p:txBody>
-          <a:bodyPr wrap="square" rtlCol="0">
-            <a:spAutoFit/>
-          </a:bodyPr>
-          <a:lstStyle/>
-          <a:p>
-            <a:r>
-              <a:rPr lang="en-US" sz="1600" dirty="0"/>
-              <a:t>temporarily</a:t>
-            </a:r>
-          </a:p>
-        </p:txBody>
-      </p:sp>
-      <p:sp>
-        <p:nvSpPr>
-          <p:cNvPr id="20" name="TextBox 19">
-            <a:extLst>
-              <a:ext uri="{FF2B5EF4-FFF2-40B4-BE49-F238E27FC236}">
-                <a16:creationId xmlns:a16="http://schemas.microsoft.com/office/drawing/2014/main" id="{A240DA6F-B5B0-4463-97A3-82B173005334}"/>
-              </a:ext>
-            </a:extLst>
-          </p:cNvPr>
-          <p:cNvSpPr txBox="1"/>
-          <p:nvPr/>
-        </p:nvSpPr>
-        <p:spPr>
-          <a:xfrm>
-            <a:off x="2137840" y="1521704"/>
-            <a:ext cx="527821" cy="523220"/>
-          </a:xfrm>
-          <a:prstGeom prst="rect">
-            <a:avLst/>
-          </a:prstGeom>
-          <a:noFill/>
-        </p:spPr>
-        <p:txBody>
-          <a:bodyPr wrap="square" rtlCol="0">
-            <a:spAutoFit/>
-          </a:bodyPr>
-          <a:lstStyle/>
-          <a:p>
-            <a:r>
-              <a:rPr lang="en-US" sz="2800" dirty="0">
-                <a:solidFill>
-                  <a:srgbClr val="00B050"/>
-                </a:solidFill>
-              </a:rPr>
-              <a:t>x</a:t>
-            </a:r>
-          </a:p>
-        </p:txBody>
-      </p:sp>
     </p:spTree>
     <p:extLst>
       <p:ext uri="{BB962C8B-B14F-4D97-AF65-F5344CB8AC3E}">

</xml_diff>